<commit_message>
Corrected version. Supposed to have been committed before the talk but didn't
</commit_message>
<xml_diff>
--- a/ZeroMQ.pptx
+++ b/ZeroMQ.pptx
@@ -22,9 +22,9 @@
     <p:sldId id="277" r:id="rId13"/>
     <p:sldId id="267" r:id="rId14"/>
     <p:sldId id="268" r:id="rId15"/>
-    <p:sldId id="273" r:id="rId16"/>
-    <p:sldId id="269" r:id="rId17"/>
-    <p:sldId id="270" r:id="rId18"/>
+    <p:sldId id="280" r:id="rId16"/>
+    <p:sldId id="273" r:id="rId17"/>
+    <p:sldId id="269" r:id="rId18"/>
     <p:sldId id="271" r:id="rId19"/>
     <p:sldId id="272" r:id="rId20"/>
     <p:sldId id="279" r:id="rId21"/>
@@ -212,7 +212,7 @@
           <a:p>
             <a:fld id="{94AAE597-33F8-4DEE-814D-19AE71EFC306}" type="datetimeFigureOut">
               <a:rPr lang="en-US" smtClean="0"/>
-              <a:t>10/3/2012</a:t>
+              <a:t>10/5/2012</a:t>
             </a:fld>
             <a:endParaRPr lang="en-US"/>
           </a:p>
@@ -1081,7 +1081,7 @@
           <a:p>
             <a:fld id="{16466266-F75F-40EF-AD05-566CB805DD91}" type="datetimeFigureOut">
               <a:rPr lang="en-US" smtClean="0"/>
-              <a:t>10/3/2012</a:t>
+              <a:t>10/5/2012</a:t>
             </a:fld>
             <a:endParaRPr lang="en-US"/>
           </a:p>
@@ -1251,7 +1251,7 @@
           <a:p>
             <a:fld id="{16466266-F75F-40EF-AD05-566CB805DD91}" type="datetimeFigureOut">
               <a:rPr lang="en-US" smtClean="0"/>
-              <a:t>10/3/2012</a:t>
+              <a:t>10/5/2012</a:t>
             </a:fld>
             <a:endParaRPr lang="en-US"/>
           </a:p>
@@ -1431,7 +1431,7 @@
           <a:p>
             <a:fld id="{16466266-F75F-40EF-AD05-566CB805DD91}" type="datetimeFigureOut">
               <a:rPr lang="en-US" smtClean="0"/>
-              <a:t>10/3/2012</a:t>
+              <a:t>10/5/2012</a:t>
             </a:fld>
             <a:endParaRPr lang="en-US"/>
           </a:p>
@@ -1601,7 +1601,7 @@
           <a:p>
             <a:fld id="{16466266-F75F-40EF-AD05-566CB805DD91}" type="datetimeFigureOut">
               <a:rPr lang="en-US" smtClean="0"/>
-              <a:t>10/3/2012</a:t>
+              <a:t>10/5/2012</a:t>
             </a:fld>
             <a:endParaRPr lang="en-US"/>
           </a:p>
@@ -1847,7 +1847,7 @@
           <a:p>
             <a:fld id="{16466266-F75F-40EF-AD05-566CB805DD91}" type="datetimeFigureOut">
               <a:rPr lang="en-US" smtClean="0"/>
-              <a:t>10/3/2012</a:t>
+              <a:t>10/5/2012</a:t>
             </a:fld>
             <a:endParaRPr lang="en-US"/>
           </a:p>
@@ -2135,7 +2135,7 @@
           <a:p>
             <a:fld id="{16466266-F75F-40EF-AD05-566CB805DD91}" type="datetimeFigureOut">
               <a:rPr lang="en-US" smtClean="0"/>
-              <a:t>10/3/2012</a:t>
+              <a:t>10/5/2012</a:t>
             </a:fld>
             <a:endParaRPr lang="en-US"/>
           </a:p>
@@ -2557,7 +2557,7 @@
           <a:p>
             <a:fld id="{16466266-F75F-40EF-AD05-566CB805DD91}" type="datetimeFigureOut">
               <a:rPr lang="en-US" smtClean="0"/>
-              <a:t>10/3/2012</a:t>
+              <a:t>10/5/2012</a:t>
             </a:fld>
             <a:endParaRPr lang="en-US"/>
           </a:p>
@@ -2675,7 +2675,7 @@
           <a:p>
             <a:fld id="{16466266-F75F-40EF-AD05-566CB805DD91}" type="datetimeFigureOut">
               <a:rPr lang="en-US" smtClean="0"/>
-              <a:t>10/3/2012</a:t>
+              <a:t>10/5/2012</a:t>
             </a:fld>
             <a:endParaRPr lang="en-US"/>
           </a:p>
@@ -2770,7 +2770,7 @@
           <a:p>
             <a:fld id="{16466266-F75F-40EF-AD05-566CB805DD91}" type="datetimeFigureOut">
               <a:rPr lang="en-US" smtClean="0"/>
-              <a:t>10/3/2012</a:t>
+              <a:t>10/5/2012</a:t>
             </a:fld>
             <a:endParaRPr lang="en-US"/>
           </a:p>
@@ -3047,7 +3047,7 @@
           <a:p>
             <a:fld id="{16466266-F75F-40EF-AD05-566CB805DD91}" type="datetimeFigureOut">
               <a:rPr lang="en-US" smtClean="0"/>
-              <a:t>10/3/2012</a:t>
+              <a:t>10/5/2012</a:t>
             </a:fld>
             <a:endParaRPr lang="en-US"/>
           </a:p>
@@ -3300,7 +3300,7 @@
           <a:p>
             <a:fld id="{16466266-F75F-40EF-AD05-566CB805DD91}" type="datetimeFigureOut">
               <a:rPr lang="en-US" smtClean="0"/>
-              <a:t>10/3/2012</a:t>
+              <a:t>10/5/2012</a:t>
             </a:fld>
             <a:endParaRPr lang="en-US"/>
           </a:p>
@@ -3513,7 +3513,7 @@
           <a:p>
             <a:fld id="{16466266-F75F-40EF-AD05-566CB805DD91}" type="datetimeFigureOut">
               <a:rPr lang="en-US" smtClean="0"/>
-              <a:t>10/3/2012</a:t>
+              <a:t>10/5/2012</a:t>
             </a:fld>
             <a:endParaRPr lang="en-US"/>
           </a:p>
@@ -9413,7 +9413,7 @@
         </p:spPr>
         <p:txBody>
           <a:bodyPr>
-            <a:normAutofit fontScale="85000" lnSpcReduction="20000"/>
+            <a:normAutofit/>
           </a:bodyPr>
           <a:lstStyle/>
           <a:p>
@@ -9430,8 +9430,11 @@
               <a:rPr lang="en-US" sz="2000" dirty="0" smtClean="0">
                 <a:latin typeface="Univers LT Std 55" pitchFamily="34" charset="0"/>
               </a:rPr>
-              <a:t>Push/Pull (one way)</a:t>
-            </a:r>
+              <a:t>Push/Pull</a:t>
+            </a:r>
+            <a:endParaRPr lang="en-US" sz="2000" dirty="0" smtClean="0">
+              <a:latin typeface="Univers LT Std 55" pitchFamily="34" charset="0"/>
+            </a:endParaRPr>
           </a:p>
           <a:p>
             <a:pPr lvl="1"/>
@@ -9439,7 +9442,7 @@
               <a:rPr lang="en-US" sz="2000" dirty="0" smtClean="0">
                 <a:latin typeface="Univers LT Std 55" pitchFamily="34" charset="0"/>
               </a:rPr>
-              <a:t>Request/Reply (two way)</a:t>
+              <a:t>Request/Reply</a:t>
             </a:r>
           </a:p>
           <a:p>
@@ -9448,13 +9451,36 @@
               <a:rPr lang="en-US" sz="2000" dirty="0" smtClean="0">
                 <a:latin typeface="Univers LT Std 55" pitchFamily="34" charset="0"/>
               </a:rPr>
-              <a:t>Pub/Sub (one to many</a:t>
-            </a:r>
+              <a:t>Pub/Sub</a:t>
+            </a:r>
+          </a:p>
+          <a:p>
+            <a:pPr lvl="1"/>
             <a:r>
               <a:rPr lang="en-US" sz="2000" dirty="0" smtClean="0">
                 <a:latin typeface="Univers LT Std 55" pitchFamily="34" charset="0"/>
               </a:rPr>
-              <a:t>)</a:t>
+              <a:t>Many </a:t>
+            </a:r>
+            <a:r>
+              <a:rPr lang="en-US" sz="2000" dirty="0" smtClean="0">
+                <a:latin typeface="Univers LT Std 55" pitchFamily="34" charset="0"/>
+              </a:rPr>
+              <a:t>More!</a:t>
+            </a:r>
+          </a:p>
+          <a:p>
+            <a:r>
+              <a:rPr lang="en-US" dirty="0" smtClean="0">
+                <a:latin typeface="Univers LT Std 55" pitchFamily="34" charset="0"/>
+              </a:rPr>
+              <a:t>Many protocols supported</a:t>
+            </a:r>
+            <a:r>
+              <a:rPr lang="en-US" sz="2400" dirty="0" smtClean="0">
+                <a:latin typeface="Univers LT Std 55" pitchFamily="34" charset="0"/>
+              </a:rPr>
+              <a:t>:</a:t>
             </a:r>
           </a:p>
           <a:p>
@@ -9463,7 +9489,43 @@
               <a:rPr lang="en-US" sz="2000" dirty="0" smtClean="0">
                 <a:latin typeface="Univers LT Std 55" pitchFamily="34" charset="0"/>
               </a:rPr>
-              <a:t>Many More!</a:t>
+              <a:t>TCP </a:t>
+            </a:r>
+            <a:endParaRPr lang="en-US" sz="2000" dirty="0" smtClean="0">
+              <a:latin typeface="Univers LT Std 55" pitchFamily="34" charset="0"/>
+            </a:endParaRPr>
+          </a:p>
+          <a:p>
+            <a:pPr lvl="1"/>
+            <a:r>
+              <a:rPr lang="en-US" sz="2000" dirty="0" smtClean="0">
+                <a:latin typeface="Univers LT Std 55" pitchFamily="34" charset="0"/>
+              </a:rPr>
+              <a:t>IPC </a:t>
+            </a:r>
+          </a:p>
+          <a:p>
+            <a:pPr lvl="1"/>
+            <a:r>
+              <a:rPr lang="en-US" sz="2000" dirty="0" err="1" smtClean="0">
+                <a:latin typeface="Univers LT Std 55" pitchFamily="34" charset="0"/>
+              </a:rPr>
+              <a:t>InProc</a:t>
+            </a:r>
+            <a:r>
+              <a:rPr lang="en-US" sz="2000" dirty="0" smtClean="0">
+                <a:latin typeface="Univers LT Std 55" pitchFamily="34" charset="0"/>
+              </a:rPr>
+              <a:t> </a:t>
+            </a:r>
+          </a:p>
+          <a:p>
+            <a:pPr lvl="1"/>
+            <a:r>
+              <a:rPr lang="en-US" sz="2000" dirty="0" smtClean="0">
+                <a:latin typeface="Univers LT Std 55" pitchFamily="34" charset="0"/>
+              </a:rPr>
+              <a:t>PGM </a:t>
             </a:r>
           </a:p>
           <a:p>
@@ -9471,106 +9533,9 @@
               <a:rPr lang="en-US" dirty="0" smtClean="0">
                 <a:latin typeface="Univers LT Std 55" pitchFamily="34" charset="0"/>
               </a:rPr>
-              <a:t>Many protocols supported</a:t>
-            </a:r>
-            <a:r>
-              <a:rPr lang="en-US" sz="2400" dirty="0" smtClean="0">
-                <a:latin typeface="Univers LT Std 55" pitchFamily="34" charset="0"/>
-              </a:rPr>
-              <a:t>:</a:t>
-            </a:r>
-          </a:p>
-          <a:p>
-            <a:pPr lvl="1"/>
-            <a:r>
-              <a:rPr lang="en-US" sz="2000" dirty="0" smtClean="0">
-                <a:latin typeface="Univers LT Std 55" pitchFamily="34" charset="0"/>
-              </a:rPr>
-              <a:t>TCP (as example)</a:t>
-            </a:r>
-          </a:p>
-          <a:p>
-            <a:pPr lvl="1"/>
-            <a:r>
-              <a:rPr lang="en-US" sz="2000" dirty="0" smtClean="0">
-                <a:latin typeface="Univers LT Std 55" pitchFamily="34" charset="0"/>
-              </a:rPr>
-              <a:t>IPC (inter-process communication: UNIX only)</a:t>
-            </a:r>
-          </a:p>
-          <a:p>
-            <a:pPr lvl="1"/>
-            <a:r>
-              <a:rPr lang="en-US" sz="2000" dirty="0" err="1" smtClean="0">
-                <a:latin typeface="Univers LT Std 55" pitchFamily="34" charset="0"/>
-              </a:rPr>
-              <a:t>InProc</a:t>
-            </a:r>
-            <a:r>
-              <a:rPr lang="en-US" sz="2000" dirty="0" smtClean="0">
-                <a:latin typeface="Univers LT Std 55" pitchFamily="34" charset="0"/>
-              </a:rPr>
-              <a:t> (inter-thread communication)</a:t>
-            </a:r>
-          </a:p>
-          <a:p>
-            <a:pPr lvl="1"/>
-            <a:r>
-              <a:rPr lang="en-US" sz="2000" dirty="0" smtClean="0">
-                <a:latin typeface="Univers LT Std 55" pitchFamily="34" charset="0"/>
-              </a:rPr>
-              <a:t>PGM (multicast)</a:t>
-            </a:r>
-          </a:p>
-          <a:p>
-            <a:r>
-              <a:rPr lang="en-US" dirty="0" smtClean="0">
-                <a:latin typeface="Univers LT Std 55" pitchFamily="34" charset="0"/>
-              </a:rPr>
-              <a:t>Did I mention… automatic load balancing?</a:t>
-            </a:r>
-          </a:p>
-          <a:p>
-            <a:r>
-              <a:rPr lang="en-US" dirty="0" err="1" smtClean="0">
-                <a:latin typeface="Univers LT Std 55" pitchFamily="34" charset="0"/>
-              </a:rPr>
-              <a:t>ZeroMQ</a:t>
-            </a:r>
-            <a:r>
-              <a:rPr lang="en-US" dirty="0" smtClean="0">
-                <a:latin typeface="Univers LT Std 55" pitchFamily="34" charset="0"/>
-              </a:rPr>
-              <a:t> is easy:</a:t>
-            </a:r>
-          </a:p>
-          <a:p>
-            <a:pPr lvl="1"/>
-            <a:r>
-              <a:rPr lang="en-US" sz="2000" dirty="0" smtClean="0">
-                <a:latin typeface="Univers LT Std 55" pitchFamily="34" charset="0"/>
-              </a:rPr>
-              <a:t>Wrote a push to talk chat app in &lt; 10 minutes</a:t>
-            </a:r>
-          </a:p>
-          <a:p>
-            <a:pPr lvl="1"/>
-            <a:r>
-              <a:rPr lang="en-US" sz="2000" dirty="0" smtClean="0">
-                <a:latin typeface="Univers LT Std 55" pitchFamily="34" charset="0"/>
-              </a:rPr>
-              <a:t>~ 60 lines of code with just one of the above pattern</a:t>
-            </a:r>
-          </a:p>
-          <a:p>
-            <a:pPr lvl="1"/>
-            <a:r>
-              <a:rPr lang="en-US" sz="2000" dirty="0" smtClean="0">
-                <a:latin typeface="Univers LT Std 55" pitchFamily="34" charset="0"/>
-              </a:rPr>
-              <a:t>See Examples</a:t>
-            </a:r>
-            <a:endParaRPr lang="en-US" sz="2000" dirty="0">
+              <a:t>Automatic load balancing</a:t>
+            </a:r>
+            <a:endParaRPr lang="en-US" dirty="0" smtClean="0">
               <a:latin typeface="Univers LT Std 55" pitchFamily="34" charset="0"/>
             </a:endParaRPr>
           </a:p>
@@ -9634,12 +9599,6 @@
               </a:rPr>
               <a:t>ZeroMQ</a:t>
             </a:r>
-            <a:r>
-              <a:rPr lang="en-US" cap="small" dirty="0" smtClean="0">
-                <a:latin typeface="Futura Std Medium" pitchFamily="34" charset="0"/>
-              </a:rPr>
-              <a:t> in Action</a:t>
-            </a:r>
             <a:endParaRPr lang="en-US" cap="small" dirty="0">
               <a:latin typeface="Futura Std Medium" pitchFamily="34" charset="0"/>
             </a:endParaRPr>
@@ -9656,7 +9615,12 @@
             <p:ph idx="1"/>
           </p:nvPr>
         </p:nvSpPr>
-        <p:spPr/>
+        <p:spPr>
+          <a:xfrm>
+            <a:off x="457200" y="1600200"/>
+            <a:ext cx="8229600" cy="4800600"/>
+          </a:xfrm>
+        </p:spPr>
         <p:txBody>
           <a:bodyPr>
             <a:normAutofit/>
@@ -9664,77 +9628,78 @@
           <a:lstStyle/>
           <a:p>
             <a:r>
+              <a:rPr lang="en-US" dirty="0" err="1" smtClean="0">
+                <a:latin typeface="Univers LT Std 55" pitchFamily="34" charset="0"/>
+              </a:rPr>
+              <a:t>ZeroMQ</a:t>
+            </a:r>
+            <a:r>
               <a:rPr lang="en-US" dirty="0" smtClean="0">
                 <a:latin typeface="Univers LT Std 55" pitchFamily="34" charset="0"/>
               </a:rPr>
-              <a:t>Typical usage: </a:t>
+              <a:t> </a:t>
             </a:r>
             <a:r>
               <a:rPr lang="en-US" dirty="0" smtClean="0">
                 <a:latin typeface="Univers LT Std 55" pitchFamily="34" charset="0"/>
               </a:rPr>
-              <a:t>As a superfast version of a traditional message queue</a:t>
-            </a:r>
-          </a:p>
-          <a:p>
-            <a:r>
-              <a:rPr lang="en-US" dirty="0" smtClean="0">
-                <a:latin typeface="Univers LT Std 55" pitchFamily="34" charset="0"/>
-              </a:rPr>
-              <a:t>Also: Service </a:t>
-            </a:r>
-            <a:r>
-              <a:rPr lang="en-US" dirty="0" smtClean="0">
-                <a:latin typeface="Univers LT Std 55" pitchFamily="34" charset="0"/>
-              </a:rPr>
-              <a:t>Oriented Architecture</a:t>
-            </a:r>
-          </a:p>
-          <a:p>
-            <a:r>
-              <a:rPr lang="en-US" dirty="0" smtClean="0">
-                <a:latin typeface="Univers LT Std 55" pitchFamily="34" charset="0"/>
-              </a:rPr>
-              <a:t>Personally, I like the UNIX Philosophy better.</a:t>
-            </a:r>
-          </a:p>
-          <a:p>
-            <a:endParaRPr lang="en-US" dirty="0">
-              <a:latin typeface="Univers LT Std 55" pitchFamily="34" charset="0"/>
-            </a:endParaRPr>
-          </a:p>
-          <a:p>
-            <a:pPr marL="0" indent="0" algn="ctr">
-              <a:buNone/>
-            </a:pPr>
-            <a:r>
-              <a:rPr lang="en-US" sz="2000" dirty="0">
-                <a:latin typeface="Univers LT Std 55" pitchFamily="34" charset="0"/>
-              </a:rPr>
-              <a:t>Write programs that do </a:t>
-            </a:r>
-            <a:r>
-              <a:rPr lang="en-US" sz="2000" u="sng" dirty="0">
-                <a:latin typeface="Univers LT Std 55" pitchFamily="34" charset="0"/>
-              </a:rPr>
-              <a:t>one thing</a:t>
-            </a:r>
-            <a:r>
-              <a:rPr lang="en-US" sz="2000" dirty="0">
-                <a:latin typeface="Univers LT Std 55" pitchFamily="34" charset="0"/>
-              </a:rPr>
-              <a:t> and do it well. Write programs to work together. Write programs to handle text streams, because that is a universal interface.</a:t>
+              <a:t>is easy:</a:t>
+            </a:r>
+          </a:p>
+          <a:p>
+            <a:pPr lvl="1"/>
+            <a:r>
+              <a:rPr lang="en-US" sz="2000" dirty="0" smtClean="0">
+                <a:latin typeface="Univers LT Std 55" pitchFamily="34" charset="0"/>
+              </a:rPr>
+              <a:t>Wrote a push to talk chat app in &lt; 10 minutes</a:t>
+            </a:r>
+          </a:p>
+          <a:p>
+            <a:pPr lvl="1"/>
+            <a:r>
+              <a:rPr lang="en-US" sz="2000" dirty="0" smtClean="0">
+                <a:latin typeface="Univers LT Std 55" pitchFamily="34" charset="0"/>
+              </a:rPr>
+              <a:t>~ 60 lines of code with just one of the above </a:t>
+            </a:r>
+            <a:r>
+              <a:rPr lang="en-US" sz="2000" dirty="0" smtClean="0">
+                <a:latin typeface="Univers LT Std 55" pitchFamily="34" charset="0"/>
+              </a:rPr>
+              <a:t>pattern</a:t>
+            </a:r>
+          </a:p>
+          <a:p>
+            <a:pPr lvl="1"/>
+            <a:r>
+              <a:rPr lang="en-US" sz="2000" dirty="0" smtClean="0">
+                <a:latin typeface="Univers LT Std 55" pitchFamily="34" charset="0"/>
+              </a:rPr>
+              <a:t>Shows the concept of “sockets with Message Queues built-in”</a:t>
             </a:r>
             <a:endParaRPr lang="en-US" sz="2000" dirty="0" smtClean="0">
               <a:latin typeface="Univers LT Std 55" pitchFamily="34" charset="0"/>
             </a:endParaRPr>
           </a:p>
+          <a:p>
+            <a:pPr lvl="1"/>
+            <a:r>
+              <a:rPr lang="en-US" sz="2000" dirty="0" smtClean="0">
+                <a:latin typeface="Univers LT Std 55" pitchFamily="34" charset="0"/>
+              </a:rPr>
+              <a:t>See Examples</a:t>
+            </a:r>
+            <a:endParaRPr lang="en-US" sz="2000" dirty="0">
+              <a:latin typeface="Univers LT Std 55" pitchFamily="34" charset="0"/>
+            </a:endParaRPr>
+          </a:p>
         </p:txBody>
       </p:sp>
     </p:spTree>
     <p:extLst>
       <p:ext uri="{BB962C8B-B14F-4D97-AF65-F5344CB8AC3E}">
-        <p14:creationId xmlns:p14="http://schemas.microsoft.com/office/powerpoint/2010/main" val="2310546858"/>
+        <p14:creationId xmlns:p14="http://schemas.microsoft.com/office/powerpoint/2010/main" val="1881696282"/>
       </p:ext>
     </p:extLst>
   </p:cSld>
@@ -9811,148 +9776,91 @@
             <p:ph idx="1"/>
           </p:nvPr>
         </p:nvSpPr>
-        <p:spPr>
-          <a:xfrm>
-            <a:off x="457200" y="1600200"/>
-            <a:ext cx="8229600" cy="4572000"/>
-          </a:xfrm>
-        </p:spPr>
+        <p:spPr/>
         <p:txBody>
           <a:bodyPr>
-            <a:normAutofit/>
+            <a:normAutofit lnSpcReduction="10000"/>
           </a:bodyPr>
           <a:lstStyle/>
           <a:p>
-            <a:pPr marL="0" indent="0">
+            <a:r>
+              <a:rPr lang="en-US" dirty="0" smtClean="0">
+                <a:latin typeface="Univers LT Std 55" pitchFamily="34" charset="0"/>
+              </a:rPr>
+              <a:t>As </a:t>
+            </a:r>
+            <a:r>
+              <a:rPr lang="en-US" dirty="0" smtClean="0">
+                <a:latin typeface="Univers LT Std 55" pitchFamily="34" charset="0"/>
+              </a:rPr>
+              <a:t>a superfast version of a traditional message queue</a:t>
+            </a:r>
+          </a:p>
+          <a:p>
+            <a:r>
+              <a:rPr lang="en-US" dirty="0" smtClean="0">
+                <a:latin typeface="Univers LT Std 55" pitchFamily="34" charset="0"/>
+              </a:rPr>
+              <a:t>To create a </a:t>
+            </a:r>
+            <a:r>
+              <a:rPr lang="en-US" dirty="0" smtClean="0">
+                <a:latin typeface="Univers LT Std 55" pitchFamily="34" charset="0"/>
+              </a:rPr>
+              <a:t>Service </a:t>
+            </a:r>
+            <a:r>
+              <a:rPr lang="en-US" dirty="0" smtClean="0">
+                <a:latin typeface="Univers LT Std 55" pitchFamily="34" charset="0"/>
+              </a:rPr>
+              <a:t>Oriented Architecture</a:t>
+            </a:r>
+          </a:p>
+          <a:p>
+            <a:r>
+              <a:rPr lang="en-US" dirty="0" smtClean="0">
+                <a:latin typeface="Univers LT Std 55" pitchFamily="34" charset="0"/>
+              </a:rPr>
+              <a:t>Personally, I like the UNIX Philosophy better.</a:t>
+            </a:r>
+          </a:p>
+          <a:p>
+            <a:endParaRPr lang="en-US" dirty="0">
+              <a:latin typeface="Univers LT Std 55" pitchFamily="34" charset="0"/>
+            </a:endParaRPr>
+          </a:p>
+          <a:p>
+            <a:pPr marL="0" indent="0" algn="ctr">
               <a:buNone/>
             </a:pPr>
             <a:r>
-              <a:rPr lang="en-US" dirty="0" smtClean="0">
-                <a:latin typeface="Univers LT Std 55" pitchFamily="34" charset="0"/>
-              </a:rPr>
-              <a:t>Projects I’ve worked on that uses </a:t>
-            </a:r>
-            <a:r>
-              <a:rPr lang="en-US" dirty="0" err="1" smtClean="0">
-                <a:latin typeface="Univers LT Std 55" pitchFamily="34" charset="0"/>
-              </a:rPr>
-              <a:t>ZeroMQ</a:t>
-            </a:r>
-            <a:r>
-              <a:rPr lang="en-US" dirty="0" smtClean="0">
-                <a:latin typeface="Univers LT Std 55" pitchFamily="34" charset="0"/>
-              </a:rPr>
-              <a:t>:</a:t>
-            </a:r>
-          </a:p>
-          <a:p>
-            <a:r>
-              <a:rPr lang="en-US" sz="2000" dirty="0" err="1" smtClean="0">
-                <a:latin typeface="Univers LT Std 55" pitchFamily="34" charset="0"/>
-              </a:rPr>
-              <a:t>edgeyo</a:t>
-            </a:r>
-            <a:r>
-              <a:rPr lang="en-US" sz="2000" dirty="0" smtClean="0">
-                <a:latin typeface="Univers LT Std 55" pitchFamily="34" charset="0"/>
-              </a:rPr>
-              <a:t> (</a:t>
-            </a:r>
-            <a:r>
-              <a:rPr lang="en-US" sz="2000" dirty="0" smtClean="0">
-                <a:latin typeface="Univers LT Std 55" pitchFamily="34" charset="0"/>
-                <a:hlinkClick r:id="rId2"/>
-              </a:rPr>
-              <a:t>http://edgeyo.com</a:t>
-            </a:r>
-            <a:r>
-              <a:rPr lang="en-US" sz="2000" dirty="0" smtClean="0">
-                <a:latin typeface="Univers LT Std 55" pitchFamily="34" charset="0"/>
-              </a:rPr>
-              <a:t>) – </a:t>
-            </a:r>
-            <a:r>
-              <a:rPr lang="en-US" sz="2000" i="1" dirty="0" smtClean="0">
-                <a:latin typeface="Univers LT Std 55" pitchFamily="34" charset="0"/>
-              </a:rPr>
-              <a:t>project shelved</a:t>
-            </a:r>
-          </a:p>
-          <a:p>
-            <a:r>
-              <a:rPr lang="en-US" sz="2000" dirty="0" smtClean="0">
-                <a:latin typeface="Univers LT Std 55" pitchFamily="34" charset="0"/>
-              </a:rPr>
-              <a:t>Strangers for Dinner (</a:t>
-            </a:r>
-            <a:r>
-              <a:rPr lang="en-US" sz="2000" dirty="0" smtClean="0">
-                <a:latin typeface="Univers LT Std 55" pitchFamily="34" charset="0"/>
-                <a:hlinkClick r:id="rId3"/>
-              </a:rPr>
-              <a:t>http://strangersfordinner.com</a:t>
-            </a:r>
-            <a:r>
-              <a:rPr lang="en-US" sz="2000" dirty="0" smtClean="0">
-                <a:latin typeface="Univers LT Std 55" pitchFamily="34" charset="0"/>
-              </a:rPr>
-              <a:t>) </a:t>
-            </a:r>
-            <a:r>
               <a:rPr lang="en-US" sz="2000" dirty="0">
                 <a:latin typeface="Univers LT Std 55" pitchFamily="34" charset="0"/>
               </a:rPr>
-              <a:t>– </a:t>
-            </a:r>
-            <a:r>
-              <a:rPr lang="en-US" sz="2000" i="1" dirty="0" smtClean="0">
-                <a:latin typeface="Univers LT Std 55" pitchFamily="34" charset="0"/>
-              </a:rPr>
-              <a:t>pivoting</a:t>
-            </a:r>
-            <a:endParaRPr lang="en-US" sz="2000" i="1" dirty="0" smtClean="0">
-              <a:latin typeface="Univers LT Std 55" pitchFamily="34" charset="0"/>
-            </a:endParaRPr>
-          </a:p>
-          <a:p>
-            <a:r>
-              <a:rPr lang="en-US" sz="2000" dirty="0" smtClean="0">
-                <a:latin typeface="Univers LT Std 55" pitchFamily="34" charset="0"/>
-              </a:rPr>
-              <a:t>A Brand Safety </a:t>
-            </a:r>
-            <a:r>
-              <a:rPr lang="en-US" sz="2000" dirty="0" smtClean="0">
-                <a:latin typeface="Univers LT Std 55" pitchFamily="34" charset="0"/>
-              </a:rPr>
-              <a:t>Product</a:t>
+              <a:t>Write programs that do </a:t>
+            </a:r>
+            <a:r>
+              <a:rPr lang="en-US" sz="2000" u="sng" dirty="0">
+                <a:latin typeface="Univers LT Std 55" pitchFamily="34" charset="0"/>
+              </a:rPr>
+              <a:t>one thing</a:t>
+            </a:r>
+            <a:r>
+              <a:rPr lang="en-US" sz="2000" dirty="0">
+                <a:latin typeface="Univers LT Std 55" pitchFamily="34" charset="0"/>
+              </a:rPr>
+              <a:t> and do it well. Write programs to work together. Write programs to handle text streams, because that is a universal interface.</a:t>
             </a:r>
             <a:endParaRPr lang="en-US" sz="2000" dirty="0" smtClean="0">
               <a:latin typeface="Univers LT Std 55" pitchFamily="34" charset="0"/>
             </a:endParaRPr>
           </a:p>
-          <a:p>
-            <a:r>
-              <a:rPr lang="en-US" sz="2000" dirty="0" smtClean="0">
-                <a:latin typeface="Univers LT Std 55" pitchFamily="34" charset="0"/>
-              </a:rPr>
-              <a:t>A Data Management Platform</a:t>
-            </a:r>
-          </a:p>
-          <a:p>
-            <a:r>
-              <a:rPr lang="en-US" sz="2000" dirty="0" smtClean="0">
-                <a:latin typeface="Univers LT Std 55" pitchFamily="34" charset="0"/>
-              </a:rPr>
-              <a:t>A Media Analysis Toolkit</a:t>
-            </a:r>
-          </a:p>
         </p:txBody>
       </p:sp>
     </p:spTree>
     <p:extLst>
       <p:ext uri="{BB962C8B-B14F-4D97-AF65-F5344CB8AC3E}">
-        <p14:creationId xmlns:p14="http://schemas.microsoft.com/office/powerpoint/2010/main" val="1061453326"/>
+        <p14:creationId xmlns:p14="http://schemas.microsoft.com/office/powerpoint/2010/main" val="2310546858"/>
       </p:ext>
     </p:extLst>
   </p:cSld>
@@ -10019,40 +9927,149 @@
           </a:p>
         </p:txBody>
       </p:sp>
-      <p:pic>
-        <p:nvPicPr>
-          <p:cNvPr id="5" name="Picture 4"/>
-          <p:cNvPicPr>
-            <a:picLocks noChangeAspect="1"/>
-          </p:cNvPicPr>
-          <p:nvPr/>
-        </p:nvPicPr>
-        <p:blipFill>
-          <a:blip r:embed="rId2">
-            <a:extLst>
-              <a:ext uri="{28A0092B-C50C-407E-A947-70E740481C1C}">
-                <a14:useLocalDpi xmlns:a14="http://schemas.microsoft.com/office/drawing/2010/main" val="0"/>
-              </a:ext>
-            </a:extLst>
-          </a:blip>
-          <a:stretch>
-            <a:fillRect/>
-          </a:stretch>
-        </p:blipFill>
+      <p:sp>
+        <p:nvSpPr>
+          <p:cNvPr id="3" name="Content Placeholder 2"/>
+          <p:cNvSpPr>
+            <a:spLocks noGrp="1"/>
+          </p:cNvSpPr>
+          <p:nvPr>
+            <p:ph idx="1"/>
+          </p:nvPr>
+        </p:nvSpPr>
         <p:spPr>
           <a:xfrm>
-            <a:off x="188364" y="1447800"/>
-            <a:ext cx="8763000" cy="4637049"/>
+            <a:off x="457200" y="1600200"/>
+            <a:ext cx="8229600" cy="4572000"/>
           </a:xfrm>
-          <a:prstGeom prst="rect">
-            <a:avLst/>
-          </a:prstGeom>
         </p:spPr>
-      </p:pic>
+        <p:txBody>
+          <a:bodyPr>
+            <a:normAutofit/>
+          </a:bodyPr>
+          <a:lstStyle/>
+          <a:p>
+            <a:pPr marL="0" indent="0">
+              <a:buNone/>
+            </a:pPr>
+            <a:r>
+              <a:rPr lang="en-US" dirty="0" smtClean="0">
+                <a:latin typeface="Univers LT Std 55" pitchFamily="34" charset="0"/>
+              </a:rPr>
+              <a:t>My projects using </a:t>
+            </a:r>
+            <a:r>
+              <a:rPr lang="en-US" dirty="0" err="1" smtClean="0">
+                <a:latin typeface="Univers LT Std 55" pitchFamily="34" charset="0"/>
+              </a:rPr>
+              <a:t>ZeroMQ</a:t>
+            </a:r>
+            <a:r>
+              <a:rPr lang="en-US" dirty="0" smtClean="0">
+                <a:latin typeface="Univers LT Std 55" pitchFamily="34" charset="0"/>
+              </a:rPr>
+              <a:t>:</a:t>
+            </a:r>
+            <a:endParaRPr lang="en-US" dirty="0" smtClean="0">
+              <a:latin typeface="Univers LT Std 55" pitchFamily="34" charset="0"/>
+            </a:endParaRPr>
+          </a:p>
+          <a:p>
+            <a:r>
+              <a:rPr lang="en-US" sz="2000" dirty="0" err="1" smtClean="0">
+                <a:latin typeface="Univers LT Std 55" pitchFamily="34" charset="0"/>
+              </a:rPr>
+              <a:t>edgeyo</a:t>
+            </a:r>
+            <a:r>
+              <a:rPr lang="en-US" sz="2000" dirty="0" smtClean="0">
+                <a:latin typeface="Univers LT Std 55" pitchFamily="34" charset="0"/>
+              </a:rPr>
+              <a:t> (</a:t>
+            </a:r>
+            <a:r>
+              <a:rPr lang="en-US" sz="2000" dirty="0" smtClean="0">
+                <a:latin typeface="Univers LT Std 55" pitchFamily="34" charset="0"/>
+                <a:hlinkClick r:id="rId2"/>
+              </a:rPr>
+              <a:t>http://edgeyo.com</a:t>
+            </a:r>
+            <a:r>
+              <a:rPr lang="en-US" sz="2000" dirty="0" smtClean="0">
+                <a:latin typeface="Univers LT Std 55" pitchFamily="34" charset="0"/>
+              </a:rPr>
+              <a:t>) – </a:t>
+            </a:r>
+            <a:r>
+              <a:rPr lang="en-US" sz="2000" i="1" dirty="0" smtClean="0">
+                <a:latin typeface="Univers LT Std 55" pitchFamily="34" charset="0"/>
+              </a:rPr>
+              <a:t>project shelved</a:t>
+            </a:r>
+          </a:p>
+          <a:p>
+            <a:r>
+              <a:rPr lang="en-US" sz="2000" dirty="0" smtClean="0">
+                <a:latin typeface="Univers LT Std 55" pitchFamily="34" charset="0"/>
+              </a:rPr>
+              <a:t>Strangers for Dinner (</a:t>
+            </a:r>
+            <a:r>
+              <a:rPr lang="en-US" sz="2000" dirty="0" smtClean="0">
+                <a:latin typeface="Univers LT Std 55" pitchFamily="34" charset="0"/>
+                <a:hlinkClick r:id="rId3"/>
+              </a:rPr>
+              <a:t>http://strangersfordinner.com</a:t>
+            </a:r>
+            <a:r>
+              <a:rPr lang="en-US" sz="2000" dirty="0" smtClean="0">
+                <a:latin typeface="Univers LT Std 55" pitchFamily="34" charset="0"/>
+              </a:rPr>
+              <a:t>) </a:t>
+            </a:r>
+            <a:r>
+              <a:rPr lang="en-US" sz="2000" dirty="0">
+                <a:latin typeface="Univers LT Std 55" pitchFamily="34" charset="0"/>
+              </a:rPr>
+              <a:t>– </a:t>
+            </a:r>
+            <a:r>
+              <a:rPr lang="en-US" sz="2000" i="1" dirty="0" smtClean="0">
+                <a:latin typeface="Univers LT Std 55" pitchFamily="34" charset="0"/>
+              </a:rPr>
+              <a:t>pivoting</a:t>
+            </a:r>
+          </a:p>
+          <a:p>
+            <a:r>
+              <a:rPr lang="en-US" sz="2000" dirty="0" smtClean="0">
+                <a:latin typeface="Univers LT Std 55" pitchFamily="34" charset="0"/>
+              </a:rPr>
+              <a:t>A Brand Safety Product</a:t>
+            </a:r>
+          </a:p>
+          <a:p>
+            <a:r>
+              <a:rPr lang="en-US" sz="2000" dirty="0" smtClean="0">
+                <a:latin typeface="Univers LT Std 55" pitchFamily="34" charset="0"/>
+              </a:rPr>
+              <a:t>A Data Management Platform</a:t>
+            </a:r>
+          </a:p>
+          <a:p>
+            <a:r>
+              <a:rPr lang="en-US" sz="2000" dirty="0" smtClean="0">
+                <a:latin typeface="Univers LT Std 55" pitchFamily="34" charset="0"/>
+              </a:rPr>
+              <a:t>A Media Analysis Toolkit</a:t>
+            </a:r>
+          </a:p>
+        </p:txBody>
+      </p:sp>
     </p:spTree>
     <p:extLst>
       <p:ext uri="{BB962C8B-B14F-4D97-AF65-F5344CB8AC3E}">
-        <p14:creationId xmlns:p14="http://schemas.microsoft.com/office/powerpoint/2010/main" val="885043409"/>
+        <p14:creationId xmlns:p14="http://schemas.microsoft.com/office/powerpoint/2010/main" val="1061453326"/>
       </p:ext>
     </p:extLst>
   </p:cSld>
@@ -10239,33 +10256,7 @@
               <a:rPr lang="en-US" dirty="0" smtClean="0">
                 <a:latin typeface="Univers LT Std 55" pitchFamily="34" charset="0"/>
               </a:rPr>
-              <a:t>Plan, plan, plan</a:t>
-            </a:r>
-          </a:p>
-          <a:p>
-            <a:r>
-              <a:rPr lang="en-US" dirty="0" smtClean="0">
-                <a:latin typeface="Univers LT Std 55" pitchFamily="34" charset="0"/>
-              </a:rPr>
-              <a:t>You cannot tack on </a:t>
-            </a:r>
-            <a:r>
-              <a:rPr lang="en-US" dirty="0" err="1" smtClean="0">
-                <a:latin typeface="Univers LT Std 55" pitchFamily="34" charset="0"/>
-              </a:rPr>
-              <a:t>ZeroMQ</a:t>
-            </a:r>
-            <a:r>
-              <a:rPr lang="en-US" dirty="0" smtClean="0">
-                <a:latin typeface="Univers LT Std 55" pitchFamily="34" charset="0"/>
-              </a:rPr>
-              <a:t> like you tack on </a:t>
-            </a:r>
-            <a:r>
-              <a:rPr lang="en-US" dirty="0" err="1" smtClean="0">
-                <a:latin typeface="Univers LT Std 55" pitchFamily="34" charset="0"/>
-              </a:rPr>
-              <a:t>RabbitMQ</a:t>
+              <a:t>Spend time planning your architecture and network topology.</a:t>
             </a:r>
             <a:endParaRPr lang="en-US" dirty="0" smtClean="0">
               <a:latin typeface="Univers LT Std 55" pitchFamily="34" charset="0"/>
@@ -10276,19 +10267,45 @@
               <a:rPr lang="en-US" dirty="0" smtClean="0">
                 <a:latin typeface="Univers LT Std 55" pitchFamily="34" charset="0"/>
               </a:rPr>
-              <a:t>Spread your load across many processes</a:t>
-            </a:r>
-          </a:p>
-          <a:p>
+              <a:t>You cannot tack on </a:t>
+            </a:r>
+            <a:r>
+              <a:rPr lang="en-US" dirty="0" err="1" smtClean="0">
+                <a:latin typeface="Univers LT Std 55" pitchFamily="34" charset="0"/>
+              </a:rPr>
+              <a:t>ZeroMQ</a:t>
+            </a:r>
             <a:r>
               <a:rPr lang="en-US" dirty="0" smtClean="0">
                 <a:latin typeface="Univers LT Std 55" pitchFamily="34" charset="0"/>
               </a:rPr>
-              <a:t>Not a poor man’s distributed processing</a:t>
+              <a:t> like you tack on </a:t>
+            </a:r>
+            <a:r>
+              <a:rPr lang="en-US" dirty="0" err="1" smtClean="0">
+                <a:latin typeface="Univers LT Std 55" pitchFamily="34" charset="0"/>
+              </a:rPr>
+              <a:t>RabbitMQ</a:t>
             </a:r>
             <a:endParaRPr lang="en-US" dirty="0" smtClean="0">
               <a:latin typeface="Univers LT Std 55" pitchFamily="34" charset="0"/>
             </a:endParaRPr>
+          </a:p>
+          <a:p>
+            <a:r>
+              <a:rPr lang="en-US" dirty="0" smtClean="0">
+                <a:latin typeface="Univers LT Std 55" pitchFamily="34" charset="0"/>
+              </a:rPr>
+              <a:t>Spread your load across many processes</a:t>
+            </a:r>
+          </a:p>
+          <a:p>
+            <a:r>
+              <a:rPr lang="en-US" dirty="0" smtClean="0">
+                <a:latin typeface="Univers LT Std 55" pitchFamily="34" charset="0"/>
+              </a:rPr>
+              <a:t>Not a poor man’s distributed processing</a:t>
+            </a:r>
           </a:p>
         </p:txBody>
       </p:sp>
@@ -10383,13 +10400,7 @@
               <a:rPr lang="en-US" dirty="0" smtClean="0">
                 <a:latin typeface="Univers LT Std 55" pitchFamily="34" charset="0"/>
               </a:rPr>
-              <a:t>Often used in </a:t>
-            </a:r>
-            <a:r>
-              <a:rPr lang="en-US" dirty="0" smtClean="0">
-                <a:latin typeface="Univers LT Std 55" pitchFamily="34" charset="0"/>
-              </a:rPr>
-              <a:t>decoupling heavy processing from live requests</a:t>
+              <a:t>Often used in decoupling heavy processing from live requests</a:t>
             </a:r>
           </a:p>
           <a:p>
@@ -10494,9 +10505,6 @@
               </a:rPr>
               <a:t>POST Handlers</a:t>
             </a:r>
-            <a:endParaRPr lang="en-US" dirty="0" smtClean="0">
-              <a:latin typeface="Univers LT Std 55" pitchFamily="34" charset="0"/>
-            </a:endParaRPr>
           </a:p>
           <a:p>
             <a:r>
@@ -10715,9 +10723,6 @@
               </a:rPr>
               <a:t>p/s: follow me now and a unicorn will present bacon and whiskey to you tonight</a:t>
             </a:r>
-            <a:endParaRPr lang="en-US" sz="1600" dirty="0" smtClean="0">
-              <a:latin typeface="Univers LT Std 55" pitchFamily="34" charset="0"/>
-            </a:endParaRPr>
           </a:p>
         </p:txBody>
       </p:sp>
@@ -13990,49 +13995,37 @@
               </a:rPr>
               <a:t> * </a:t>
             </a:r>
+          </a:p>
+          <a:p>
+            <a:r>
+              <a:rPr lang="en-US" dirty="0" err="1" smtClean="0">
+                <a:latin typeface="Univers LT Std 55" pitchFamily="34" charset="0"/>
+              </a:rPr>
+              <a:t>Beanstalk’d</a:t>
+            </a:r>
             <a:endParaRPr lang="en-US" dirty="0" smtClean="0">
               <a:latin typeface="Univers LT Std 55" pitchFamily="34" charset="0"/>
             </a:endParaRPr>
           </a:p>
           <a:p>
             <a:r>
-              <a:rPr lang="en-US" dirty="0" err="1" smtClean="0">
-                <a:latin typeface="Univers LT Std 55" pitchFamily="34" charset="0"/>
-              </a:rPr>
-              <a:t>Beanstalk’d</a:t>
-            </a:r>
+              <a:rPr lang="en-US" dirty="0" smtClean="0">
+                <a:latin typeface="Univers LT Std 55" pitchFamily="34" charset="0"/>
+              </a:rPr>
+              <a:t>Celery (Python based) *</a:t>
+            </a:r>
+          </a:p>
+          <a:p>
+            <a:endParaRPr lang="en-US" dirty="0">
+              <a:latin typeface="Univers LT Std 55" pitchFamily="34" charset="0"/>
+            </a:endParaRPr>
+          </a:p>
+          <a:p>
             <a:endParaRPr lang="en-US" dirty="0" smtClean="0">
               <a:latin typeface="Univers LT Std 55" pitchFamily="34" charset="0"/>
             </a:endParaRPr>
           </a:p>
           <a:p>
-            <a:r>
-              <a:rPr lang="en-US" dirty="0" smtClean="0">
-                <a:latin typeface="Univers LT Std 55" pitchFamily="34" charset="0"/>
-              </a:rPr>
-              <a:t>Celery (Python based</a:t>
-            </a:r>
-            <a:r>
-              <a:rPr lang="en-US" dirty="0" smtClean="0">
-                <a:latin typeface="Univers LT Std 55" pitchFamily="34" charset="0"/>
-              </a:rPr>
-              <a:t>) *</a:t>
-            </a:r>
-            <a:endParaRPr lang="en-US" dirty="0" smtClean="0">
-              <a:latin typeface="Univers LT Std 55" pitchFamily="34" charset="0"/>
-            </a:endParaRPr>
-          </a:p>
-          <a:p>
-            <a:endParaRPr lang="en-US" dirty="0">
-              <a:latin typeface="Univers LT Std 55" pitchFamily="34" charset="0"/>
-            </a:endParaRPr>
-          </a:p>
-          <a:p>
-            <a:endParaRPr lang="en-US" dirty="0" smtClean="0">
-              <a:latin typeface="Univers LT Std 55" pitchFamily="34" charset="0"/>
-            </a:endParaRPr>
-          </a:p>
-          <a:p>
             <a:pPr marL="0" indent="0" algn="ctr">
               <a:buNone/>
             </a:pPr>
@@ -14040,19 +14033,7 @@
               <a:rPr lang="en-US" sz="1200" dirty="0" smtClean="0">
                 <a:latin typeface="Univers LT Std 55" pitchFamily="34" charset="0"/>
               </a:rPr>
-              <a:t>Some are technically not message queues but for the purposes of SOA and the like, </a:t>
-            </a:r>
-            <a:r>
-              <a:rPr lang="en-US" sz="1200" dirty="0" smtClean="0">
-                <a:latin typeface="Univers LT Std 55" pitchFamily="34" charset="0"/>
-              </a:rPr>
-              <a:t>but for the purposes of this talk, let’s </a:t>
-            </a:r>
-            <a:r>
-              <a:rPr lang="en-US" sz="1200" dirty="0" smtClean="0">
-                <a:latin typeface="Univers LT Std 55" pitchFamily="34" charset="0"/>
-              </a:rPr>
-              <a:t>consider them MQs</a:t>
+              <a:t>Some are technically not message queues but for the purposes of SOA and the like, but for the purposes of this talk, let’s consider them MQs</a:t>
             </a:r>
           </a:p>
         </p:txBody>
@@ -14142,19 +14123,7 @@
               <a:rPr lang="en-US" dirty="0" smtClean="0">
                 <a:latin typeface="Univers LT Std 55" pitchFamily="34" charset="0"/>
               </a:rPr>
-              <a:t>Literally, </a:t>
-            </a:r>
-            <a:r>
-              <a:rPr lang="en-US" dirty="0" smtClean="0">
-                <a:latin typeface="Univers LT Std 55" pitchFamily="34" charset="0"/>
-              </a:rPr>
-              <a:t>0 </a:t>
-            </a:r>
-            <a:r>
-              <a:rPr lang="en-US" dirty="0" smtClean="0">
-                <a:latin typeface="Univers LT Std 55" pitchFamily="34" charset="0"/>
-              </a:rPr>
-              <a:t>MQ (or </a:t>
+              <a:t>Literally, 0 MQ (or </a:t>
             </a:r>
             <a:r>
               <a:rPr lang="en-US" dirty="0">
@@ -14185,9 +14154,6 @@
               </a:rPr>
               <a:t> uses sockets</a:t>
             </a:r>
-            <a:endParaRPr lang="en-US" dirty="0" smtClean="0">
-              <a:latin typeface="Univers LT Std 55" pitchFamily="34" charset="0"/>
-            </a:endParaRPr>
           </a:p>
           <a:p>
             <a:r>
@@ -15669,9 +15635,6 @@
               </a:rPr>
               <a:t> as a network stack with built in MQ</a:t>
             </a:r>
-            <a:endParaRPr lang="en-US" dirty="0" smtClean="0">
-              <a:latin typeface="Univers LT Std 55" pitchFamily="34" charset="0"/>
-            </a:endParaRPr>
           </a:p>
         </p:txBody>
       </p:sp>

</xml_diff>